<commit_message>
good progress on poster
</commit_message>
<xml_diff>
--- a/presentations/coda2016/images/coda2016_poster_background.pptx
+++ b/presentations/coda2016/images/coda2016_poster_background.pptx
@@ -288,7 +288,7 @@
           <a:p>
             <a:fld id="{3C41F5A3-4A3A-8D46-A1AB-39ED3C4AC378}" type="datetimeFigureOut">
               <a:rPr lang="en-US" smtClean="0"/>
-              <a:t>2/16/16</a:t>
+              <a:t>2/19/16</a:t>
             </a:fld>
             <a:endParaRPr lang="en-US"/>
           </a:p>
@@ -458,7 +458,7 @@
           <a:p>
             <a:fld id="{3C41F5A3-4A3A-8D46-A1AB-39ED3C4AC378}" type="datetimeFigureOut">
               <a:rPr lang="en-US" smtClean="0"/>
-              <a:t>2/16/16</a:t>
+              <a:t>2/19/16</a:t>
             </a:fld>
             <a:endParaRPr lang="en-US"/>
           </a:p>
@@ -638,7 +638,7 @@
           <a:p>
             <a:fld id="{3C41F5A3-4A3A-8D46-A1AB-39ED3C4AC378}" type="datetimeFigureOut">
               <a:rPr lang="en-US" smtClean="0"/>
-              <a:t>2/16/16</a:t>
+              <a:t>2/19/16</a:t>
             </a:fld>
             <a:endParaRPr lang="en-US"/>
           </a:p>
@@ -808,7 +808,7 @@
           <a:p>
             <a:fld id="{3C41F5A3-4A3A-8D46-A1AB-39ED3C4AC378}" type="datetimeFigureOut">
               <a:rPr lang="en-US" smtClean="0"/>
-              <a:t>2/16/16</a:t>
+              <a:t>2/19/16</a:t>
             </a:fld>
             <a:endParaRPr lang="en-US"/>
           </a:p>
@@ -1054,7 +1054,7 @@
           <a:p>
             <a:fld id="{3C41F5A3-4A3A-8D46-A1AB-39ED3C4AC378}" type="datetimeFigureOut">
               <a:rPr lang="en-US" smtClean="0"/>
-              <a:t>2/16/16</a:t>
+              <a:t>2/19/16</a:t>
             </a:fld>
             <a:endParaRPr lang="en-US"/>
           </a:p>
@@ -1342,7 +1342,7 @@
           <a:p>
             <a:fld id="{3C41F5A3-4A3A-8D46-A1AB-39ED3C4AC378}" type="datetimeFigureOut">
               <a:rPr lang="en-US" smtClean="0"/>
-              <a:t>2/16/16</a:t>
+              <a:t>2/19/16</a:t>
             </a:fld>
             <a:endParaRPr lang="en-US"/>
           </a:p>
@@ -1769,7 +1769,7 @@
           <a:p>
             <a:fld id="{3C41F5A3-4A3A-8D46-A1AB-39ED3C4AC378}" type="datetimeFigureOut">
               <a:rPr lang="en-US" smtClean="0"/>
-              <a:t>2/16/16</a:t>
+              <a:t>2/19/16</a:t>
             </a:fld>
             <a:endParaRPr lang="en-US"/>
           </a:p>
@@ -1887,7 +1887,7 @@
           <a:p>
             <a:fld id="{3C41F5A3-4A3A-8D46-A1AB-39ED3C4AC378}" type="datetimeFigureOut">
               <a:rPr lang="en-US" smtClean="0"/>
-              <a:t>2/16/16</a:t>
+              <a:t>2/19/16</a:t>
             </a:fld>
             <a:endParaRPr lang="en-US"/>
           </a:p>
@@ -1982,7 +1982,7 @@
           <a:p>
             <a:fld id="{3C41F5A3-4A3A-8D46-A1AB-39ED3C4AC378}" type="datetimeFigureOut">
               <a:rPr lang="en-US" smtClean="0"/>
-              <a:t>2/16/16</a:t>
+              <a:t>2/19/16</a:t>
             </a:fld>
             <a:endParaRPr lang="en-US"/>
           </a:p>
@@ -2259,7 +2259,7 @@
           <a:p>
             <a:fld id="{3C41F5A3-4A3A-8D46-A1AB-39ED3C4AC378}" type="datetimeFigureOut">
               <a:rPr lang="en-US" smtClean="0"/>
-              <a:t>2/16/16</a:t>
+              <a:t>2/19/16</a:t>
             </a:fld>
             <a:endParaRPr lang="en-US"/>
           </a:p>
@@ -2512,7 +2512,7 @@
           <a:p>
             <a:fld id="{3C41F5A3-4A3A-8D46-A1AB-39ED3C4AC378}" type="datetimeFigureOut">
               <a:rPr lang="en-US" smtClean="0"/>
-              <a:t>2/16/16</a:t>
+              <a:t>2/19/16</a:t>
             </a:fld>
             <a:endParaRPr lang="en-US"/>
           </a:p>
@@ -2725,7 +2725,7 @@
           <a:p>
             <a:fld id="{3C41F5A3-4A3A-8D46-A1AB-39ED3C4AC378}" type="datetimeFigureOut">
               <a:rPr lang="en-US" smtClean="0"/>
-              <a:t>2/16/16</a:t>
+              <a:t>2/19/16</a:t>
             </a:fld>
             <a:endParaRPr lang="en-US"/>
           </a:p>
@@ -3473,8 +3473,8 @@
         </p:nvSpPr>
         <p:spPr>
           <a:xfrm>
-            <a:off x="272148" y="10358292"/>
-            <a:ext cx="13746907" cy="7753997"/>
+            <a:off x="272147" y="9884657"/>
+            <a:ext cx="14054328" cy="10515600"/>
           </a:xfrm>
           <a:prstGeom prst="rect">
             <a:avLst/>
@@ -3523,7 +3523,7 @@
         <p:spPr>
           <a:xfrm>
             <a:off x="272148" y="4764017"/>
-            <a:ext cx="13746907" cy="5261235"/>
+            <a:ext cx="14054328" cy="5120640"/>
           </a:xfrm>
           <a:prstGeom prst="rect">
             <a:avLst/>
@@ -3571,8 +3571,8 @@
         </p:nvSpPr>
         <p:spPr>
           <a:xfrm>
-            <a:off x="28940831" y="4764017"/>
-            <a:ext cx="13723427" cy="6268954"/>
+            <a:off x="28663014" y="4764017"/>
+            <a:ext cx="14054328" cy="6268954"/>
           </a:xfrm>
           <a:prstGeom prst="rect">
             <a:avLst/>
@@ -3620,8 +3620,8 @@
         </p:nvSpPr>
         <p:spPr>
           <a:xfrm>
-            <a:off x="28940832" y="11350465"/>
-            <a:ext cx="13723426" cy="9683615"/>
+            <a:off x="28663016" y="11032971"/>
+            <a:ext cx="14054328" cy="10318604"/>
           </a:xfrm>
           <a:prstGeom prst="rect">
             <a:avLst/>
@@ -3669,8 +3669,8 @@
         </p:nvSpPr>
         <p:spPr>
           <a:xfrm>
-            <a:off x="28940832" y="21351575"/>
-            <a:ext cx="13723426" cy="6584049"/>
+            <a:off x="28663016" y="21351575"/>
+            <a:ext cx="14054328" cy="6584049"/>
           </a:xfrm>
           <a:prstGeom prst="rect">
             <a:avLst/>
@@ -3718,8 +3718,8 @@
         </p:nvSpPr>
         <p:spPr>
           <a:xfrm>
-            <a:off x="272148" y="18414742"/>
-            <a:ext cx="13746907" cy="8378642"/>
+            <a:off x="272147" y="20400257"/>
+            <a:ext cx="14054328" cy="6393126"/>
           </a:xfrm>
           <a:prstGeom prst="rect">
             <a:avLst/>
@@ -3767,8 +3767,8 @@
         </p:nvSpPr>
         <p:spPr>
           <a:xfrm>
-            <a:off x="14327254" y="18713803"/>
-            <a:ext cx="14247878" cy="9221821"/>
+            <a:off x="14326475" y="18713803"/>
+            <a:ext cx="14336541" cy="9221821"/>
           </a:xfrm>
           <a:prstGeom prst="rect">
             <a:avLst/>
@@ -3816,8 +3816,8 @@
         </p:nvSpPr>
         <p:spPr>
           <a:xfrm>
-            <a:off x="12832888" y="5680976"/>
-            <a:ext cx="17290064" cy="16575083"/>
+            <a:off x="13745712" y="5680976"/>
+            <a:ext cx="15544800" cy="16575083"/>
           </a:xfrm>
           <a:prstGeom prst="rect">
             <a:avLst/>

</xml_diff>